<commit_message>
Revised MongoDB Intro Files
</commit_message>
<xml_diff>
--- a/MongoDB_Intro.pptx
+++ b/MongoDB_Intro.pptx
@@ -5,7 +5,7 @@
     <p:sldMasterId id="2147483648" r:id="rId1"/>
   </p:sldMasterIdLst>
   <p:notesMasterIdLst>
-    <p:notesMasterId r:id="rId40"/>
+    <p:notesMasterId r:id="rId41"/>
   </p:notesMasterIdLst>
   <p:sldIdLst>
     <p:sldId id="256" r:id="rId2"/>
@@ -45,7 +45,8 @@
     <p:sldId id="285" r:id="rId36"/>
     <p:sldId id="294" r:id="rId37"/>
     <p:sldId id="281" r:id="rId38"/>
-    <p:sldId id="287" r:id="rId39"/>
+    <p:sldId id="340" r:id="rId39"/>
+    <p:sldId id="287" r:id="rId40"/>
   </p:sldIdLst>
   <p:sldSz cx="9144000" cy="6858000" type="screen4x3"/>
   <p:notesSz cx="6858000" cy="9144000"/>
@@ -229,7 +230,7 @@
           <a:p>
             <a:fld id="{394F935D-5832-4835-A4AF-9373148C9946}" type="datetimeFigureOut">
               <a:rPr lang="en-US" smtClean="0"/>
-              <a:t>6/30/2017</a:t>
+              <a:t>7/10/2017</a:t>
             </a:fld>
             <a:endParaRPr lang="en-US"/>
           </a:p>
@@ -560,11 +561,7 @@
             </a:pPr>
             <a:r>
               <a:rPr lang="en-US" dirty="0" smtClean="0"/>
-              <a:t>CRUD </a:t>
-            </a:r>
-            <a:r>
-              <a:rPr lang="en-US" dirty="0" smtClean="0"/>
-              <a:t>= Create Read Update Delete</a:t>
+              <a:t>CRUD = Create Read Update Delete</a:t>
             </a:r>
           </a:p>
         </p:txBody>
@@ -777,11 +774,7 @@
           <a:p>
             <a:r>
               <a:rPr lang="en-US" dirty="0" smtClean="0"/>
-              <a:t>https://</a:t>
-            </a:r>
-            <a:r>
-              <a:rPr lang="en-US" dirty="0" smtClean="0"/>
-              <a:t>docs.mongodb.com/manual/reference/built-in-roles</a:t>
+              <a:t>https://docs.mongodb.com/manual/reference/built-in-roles</a:t>
             </a:r>
           </a:p>
           <a:p>
@@ -793,7 +786,6 @@
               <a:rPr lang="en-US" dirty="0" smtClean="0"/>
               <a:t> is the most privileged system admin</a:t>
             </a:r>
-            <a:endParaRPr lang="en-US" dirty="0" smtClean="0"/>
           </a:p>
         </p:txBody>
       </p:sp>
@@ -1966,11 +1958,7 @@
             </a:pPr>
             <a:r>
               <a:rPr lang="en-US" dirty="0" smtClean="0"/>
-              <a:t>_</a:t>
-            </a:r>
-            <a:r>
-              <a:rPr lang="en-US" dirty="0" smtClean="0"/>
-              <a:t>id field auto created</a:t>
+              <a:t>_id field auto created</a:t>
             </a:r>
           </a:p>
           <a:p>
@@ -5448,10 +5436,7 @@
           <a:bodyPr/>
           <a:lstStyle/>
           <a:p>
-            <a:r>
-              <a:rPr lang="en-US" baseline="0" dirty="0" smtClean="0"/>
-              <a:t>Very Important to understand the Data Model First!</a:t>
-            </a:r>
+            <a:endParaRPr lang="en-US" baseline="0" dirty="0" smtClean="0"/>
           </a:p>
         </p:txBody>
       </p:sp>
@@ -5536,28 +5521,8 @@
           <a:lstStyle/>
           <a:p>
             <a:r>
-              <a:rPr lang="en-US" dirty="0" smtClean="0"/>
-              <a:t>The point of this exercise is to recognize the free resource of mLab.com</a:t>
-            </a:r>
-          </a:p>
-          <a:p>
-            <a:r>
-              <a:rPr lang="en-US" dirty="0" smtClean="0"/>
-              <a:t>Use </a:t>
-            </a:r>
-            <a:r>
-              <a:rPr lang="en-US" dirty="0" err="1" smtClean="0"/>
-              <a:t>JupyterHub</a:t>
-            </a:r>
-            <a:r>
-              <a:rPr lang="en-US" dirty="0" smtClean="0"/>
-              <a:t> on:</a:t>
-            </a:r>
-          </a:p>
-          <a:p>
-            <a:r>
-              <a:rPr lang="en-US" dirty="0" smtClean="0"/>
-              <a:t>https://jupyterhub.med.utah.edu/hub/login</a:t>
+              <a:rPr lang="en-US" baseline="0" dirty="0" smtClean="0"/>
+              <a:t>Very Important to understand the Data Model First!</a:t>
             </a:r>
           </a:p>
         </p:txBody>
@@ -5580,6 +5545,121 @@
             <a:fld id="{1180F5EB-5A39-4CA1-A0AD-D282FE92923B}" type="slidenum">
               <a:rPr lang="en-US" smtClean="0"/>
               <a:t>38</a:t>
+            </a:fld>
+            <a:endParaRPr lang="en-US"/>
+          </a:p>
+        </p:txBody>
+      </p:sp>
+    </p:spTree>
+    <p:extLst>
+      <p:ext uri="{BB962C8B-B14F-4D97-AF65-F5344CB8AC3E}">
+        <p14:creationId xmlns:p14="http://schemas.microsoft.com/office/powerpoint/2010/main" val="2485882524"/>
+      </p:ext>
+    </p:extLst>
+  </p:cSld>
+  <p:clrMapOvr>
+    <a:masterClrMapping/>
+  </p:clrMapOvr>
+</p:notes>
+</file>
+
+<file path=ppt/notesSlides/notesSlide38.xml><?xml version="1.0" encoding="utf-8"?>
+<p:notes xmlns:a="http://schemas.openxmlformats.org/drawingml/2006/main" xmlns:r="http://schemas.openxmlformats.org/officeDocument/2006/relationships" xmlns:p="http://schemas.openxmlformats.org/presentationml/2006/main">
+  <p:cSld>
+    <p:spTree>
+      <p:nvGrpSpPr>
+        <p:cNvPr id="1" name=""/>
+        <p:cNvGrpSpPr/>
+        <p:nvPr/>
+      </p:nvGrpSpPr>
+      <p:grpSpPr>
+        <a:xfrm>
+          <a:off x="0" y="0"/>
+          <a:ext cx="0" cy="0"/>
+          <a:chOff x="0" y="0"/>
+          <a:chExt cx="0" cy="0"/>
+        </a:xfrm>
+      </p:grpSpPr>
+      <p:sp>
+        <p:nvSpPr>
+          <p:cNvPr id="2" name="Slide Image Placeholder 1"/>
+          <p:cNvSpPr>
+            <a:spLocks noGrp="1" noRot="1" noChangeAspect="1"/>
+          </p:cNvSpPr>
+          <p:nvPr>
+            <p:ph type="sldImg"/>
+          </p:nvPr>
+        </p:nvSpPr>
+        <p:spPr/>
+      </p:sp>
+      <p:sp>
+        <p:nvSpPr>
+          <p:cNvPr id="3" name="Notes Placeholder 2"/>
+          <p:cNvSpPr>
+            <a:spLocks noGrp="1"/>
+          </p:cNvSpPr>
+          <p:nvPr>
+            <p:ph type="body" idx="1"/>
+          </p:nvPr>
+        </p:nvSpPr>
+        <p:spPr/>
+        <p:txBody>
+          <a:bodyPr/>
+          <a:lstStyle/>
+          <a:p>
+            <a:r>
+              <a:rPr lang="en-US" dirty="0" smtClean="0"/>
+              <a:t>The </a:t>
+            </a:r>
+            <a:r>
+              <a:rPr lang="en-US" dirty="0" smtClean="0"/>
+              <a:t>main point </a:t>
+            </a:r>
+            <a:r>
+              <a:rPr lang="en-US" dirty="0" smtClean="0"/>
+              <a:t>of this exercise is to recognize the free resource of mLab.com</a:t>
+            </a:r>
+          </a:p>
+          <a:p>
+            <a:r>
+              <a:rPr lang="en-US" dirty="0" smtClean="0"/>
+              <a:t>Use </a:t>
+            </a:r>
+            <a:r>
+              <a:rPr lang="en-US" dirty="0" err="1" smtClean="0"/>
+              <a:t>JupyterHub</a:t>
+            </a:r>
+            <a:r>
+              <a:rPr lang="en-US" dirty="0" smtClean="0"/>
+              <a:t> on:</a:t>
+            </a:r>
+          </a:p>
+          <a:p>
+            <a:r>
+              <a:rPr lang="en-US" dirty="0" smtClean="0"/>
+              <a:t>https://jupyterhub.med.utah.edu/hub/login</a:t>
+            </a:r>
+          </a:p>
+        </p:txBody>
+      </p:sp>
+      <p:sp>
+        <p:nvSpPr>
+          <p:cNvPr id="4" name="Slide Number Placeholder 3"/>
+          <p:cNvSpPr>
+            <a:spLocks noGrp="1"/>
+          </p:cNvSpPr>
+          <p:nvPr>
+            <p:ph type="sldNum" sz="quarter" idx="10"/>
+          </p:nvPr>
+        </p:nvSpPr>
+        <p:spPr/>
+        <p:txBody>
+          <a:bodyPr/>
+          <a:lstStyle/>
+          <a:p>
+            <a:fld id="{1180F5EB-5A39-4CA1-A0AD-D282FE92923B}" type="slidenum">
+              <a:rPr lang="en-US" smtClean="0"/>
+              <a:t>39</a:t>
             </a:fld>
             <a:endParaRPr lang="en-US"/>
           </a:p>
@@ -5746,11 +5826,7 @@
           <a:p>
             <a:r>
               <a:rPr lang="en-US" dirty="0" smtClean="0"/>
-              <a:t>https</a:t>
-            </a:r>
-            <a:r>
-              <a:rPr lang="en-US" dirty="0" smtClean="0"/>
-              <a:t>://docs.mongodb.com/manual/core/document-validation</a:t>
+              <a:t>https://docs.mongodb.com/manual/core/document-validation</a:t>
             </a:r>
           </a:p>
           <a:p>
@@ -5931,11 +6007,7 @@
             </a:r>
             <a:r>
               <a:rPr lang="en-US" baseline="0" dirty="0" smtClean="0"/>
-              <a:t> a replacement) to Relational Technologies</a:t>
-            </a:r>
-            <a:r>
-              <a:rPr lang="en-US" baseline="0" dirty="0" smtClean="0"/>
-              <a:t>.</a:t>
+              <a:t> a replacement) to Relational Technologies.</a:t>
             </a:r>
           </a:p>
           <a:p>
@@ -6174,11 +6246,7 @@
             </a:pPr>
             <a:r>
               <a:rPr lang="en-US" b="1" baseline="0" dirty="0" smtClean="0"/>
-              <a:t>There is </a:t>
-            </a:r>
-            <a:r>
-              <a:rPr lang="en-US" b="1" baseline="0" dirty="0" smtClean="0"/>
-              <a:t>NO </a:t>
+              <a:t>There is NO </a:t>
             </a:r>
             <a:r>
               <a:rPr lang="en-US" b="1" baseline="0" dirty="0" err="1" smtClean="0"/>
@@ -6186,11 +6254,7 @@
             </a:r>
             <a:r>
               <a:rPr lang="en-US" b="1" baseline="0" dirty="0" smtClean="0"/>
-              <a:t> </a:t>
-            </a:r>
-            <a:r>
-              <a:rPr lang="en-US" b="1" baseline="0" dirty="0" smtClean="0"/>
-              <a:t>Command!</a:t>
+              <a:t> Command!</a:t>
             </a:r>
             <a:endParaRPr lang="en-US" b="1" dirty="0"/>
           </a:p>
@@ -6414,7 +6478,7 @@
             <a:fld id="{1D8BD707-D9CF-40AE-B4C6-C98DA3205C09}" type="datetimeFigureOut">
               <a:rPr lang="en-US" smtClean="0"/>
               <a:pPr/>
-              <a:t>6/30/2017</a:t>
+              <a:t>7/10/2017</a:t>
             </a:fld>
             <a:endParaRPr lang="en-US"/>
           </a:p>
@@ -6581,7 +6645,7 @@
             <a:fld id="{1D8BD707-D9CF-40AE-B4C6-C98DA3205C09}" type="datetimeFigureOut">
               <a:rPr lang="en-US" smtClean="0"/>
               <a:pPr/>
-              <a:t>6/30/2017</a:t>
+              <a:t>7/10/2017</a:t>
             </a:fld>
             <a:endParaRPr lang="en-US"/>
           </a:p>
@@ -6758,7 +6822,7 @@
             <a:fld id="{1D8BD707-D9CF-40AE-B4C6-C98DA3205C09}" type="datetimeFigureOut">
               <a:rPr lang="en-US" smtClean="0"/>
               <a:pPr/>
-              <a:t>6/30/2017</a:t>
+              <a:t>7/10/2017</a:t>
             </a:fld>
             <a:endParaRPr lang="en-US"/>
           </a:p>
@@ -6925,7 +6989,7 @@
             <a:fld id="{1D8BD707-D9CF-40AE-B4C6-C98DA3205C09}" type="datetimeFigureOut">
               <a:rPr lang="en-US" smtClean="0"/>
               <a:pPr/>
-              <a:t>6/30/2017</a:t>
+              <a:t>7/10/2017</a:t>
             </a:fld>
             <a:endParaRPr lang="en-US"/>
           </a:p>
@@ -7168,7 +7232,7 @@
             <a:fld id="{1D8BD707-D9CF-40AE-B4C6-C98DA3205C09}" type="datetimeFigureOut">
               <a:rPr lang="en-US" smtClean="0"/>
               <a:pPr/>
-              <a:t>6/30/2017</a:t>
+              <a:t>7/10/2017</a:t>
             </a:fld>
             <a:endParaRPr lang="en-US"/>
           </a:p>
@@ -7453,7 +7517,7 @@
             <a:fld id="{1D8BD707-D9CF-40AE-B4C6-C98DA3205C09}" type="datetimeFigureOut">
               <a:rPr lang="en-US" smtClean="0"/>
               <a:pPr/>
-              <a:t>6/30/2017</a:t>
+              <a:t>7/10/2017</a:t>
             </a:fld>
             <a:endParaRPr lang="en-US"/>
           </a:p>
@@ -7872,7 +7936,7 @@
             <a:fld id="{1D8BD707-D9CF-40AE-B4C6-C98DA3205C09}" type="datetimeFigureOut">
               <a:rPr lang="en-US" smtClean="0"/>
               <a:pPr/>
-              <a:t>6/30/2017</a:t>
+              <a:t>7/10/2017</a:t>
             </a:fld>
             <a:endParaRPr lang="en-US"/>
           </a:p>
@@ -7987,7 +8051,7 @@
             <a:fld id="{1D8BD707-D9CF-40AE-B4C6-C98DA3205C09}" type="datetimeFigureOut">
               <a:rPr lang="en-US" smtClean="0"/>
               <a:pPr/>
-              <a:t>6/30/2017</a:t>
+              <a:t>7/10/2017</a:t>
             </a:fld>
             <a:endParaRPr lang="en-US"/>
           </a:p>
@@ -8079,7 +8143,7 @@
             <a:fld id="{1D8BD707-D9CF-40AE-B4C6-C98DA3205C09}" type="datetimeFigureOut">
               <a:rPr lang="en-US" smtClean="0"/>
               <a:pPr/>
-              <a:t>6/30/2017</a:t>
+              <a:t>7/10/2017</a:t>
             </a:fld>
             <a:endParaRPr lang="en-US"/>
           </a:p>
@@ -8353,7 +8417,7 @@
             <a:fld id="{1D8BD707-D9CF-40AE-B4C6-C98DA3205C09}" type="datetimeFigureOut">
               <a:rPr lang="en-US" smtClean="0"/>
               <a:pPr/>
-              <a:t>6/30/2017</a:t>
+              <a:t>7/10/2017</a:t>
             </a:fld>
             <a:endParaRPr lang="en-US"/>
           </a:p>
@@ -8603,7 +8667,7 @@
             <a:fld id="{1D8BD707-D9CF-40AE-B4C6-C98DA3205C09}" type="datetimeFigureOut">
               <a:rPr lang="en-US" smtClean="0"/>
               <a:pPr/>
-              <a:t>6/30/2017</a:t>
+              <a:t>7/10/2017</a:t>
             </a:fld>
             <a:endParaRPr lang="en-US"/>
           </a:p>
@@ -8813,7 +8877,7 @@
             <a:fld id="{1D8BD707-D9CF-40AE-B4C6-C98DA3205C09}" type="datetimeFigureOut">
               <a:rPr lang="en-US" smtClean="0"/>
               <a:pPr/>
-              <a:t>6/30/2017</a:t>
+              <a:t>7/10/2017</a:t>
             </a:fld>
             <a:endParaRPr lang="en-US"/>
           </a:p>
@@ -9841,9 +9905,14 @@
               <a:buChar char="•"/>
             </a:pPr>
             <a:r>
-              <a:rPr lang="en-US" dirty="0" smtClean="0"/>
+              <a:rPr lang="en-US" b="1" dirty="0" smtClean="0"/>
               <a:t>root</a:t>
             </a:r>
+            <a:r>
+              <a:rPr lang="en-US" dirty="0" smtClean="0"/>
+              <a:t> (Most Powerful)</a:t>
+            </a:r>
+            <a:endParaRPr lang="en-US" dirty="0" smtClean="0"/>
           </a:p>
           <a:p>
             <a:r>
@@ -10154,7 +10223,6 @@
               <a:rPr lang="en-US" i="1" dirty="0" smtClean="0"/>
               <a:t>db;</a:t>
             </a:r>
-            <a:endParaRPr lang="en-US" i="1" dirty="0" smtClean="0"/>
           </a:p>
           <a:p>
             <a:r>
@@ -10322,11 +10390,7 @@
           <a:p>
             <a:r>
               <a:rPr lang="en-US" dirty="0" smtClean="0"/>
-              <a:t>Logout </a:t>
-            </a:r>
-            <a:r>
-              <a:rPr lang="en-US" dirty="0" smtClean="0"/>
-              <a:t>of Mongo Shell</a:t>
+              <a:t>Logout of Mongo Shell</a:t>
             </a:r>
           </a:p>
           <a:p>
@@ -13707,8 +13771,13 @@
             </a:r>
             <a:r>
               <a:rPr lang="en-US" dirty="0" smtClean="0"/>
-              <a:t>a Document database</a:t>
-            </a:r>
+              <a:t>a Document </a:t>
+            </a:r>
+            <a:r>
+              <a:rPr lang="en-US" dirty="0" smtClean="0"/>
+              <a:t>Database</a:t>
+            </a:r>
+            <a:endParaRPr lang="en-US" dirty="0" smtClean="0"/>
           </a:p>
           <a:p>
             <a:pPr lvl="1"/>
@@ -15989,6 +16058,159 @@
             <p:ph type="title"/>
           </p:nvPr>
         </p:nvSpPr>
+        <p:spPr>
+          <a:xfrm>
+            <a:off x="457200" y="381000"/>
+            <a:ext cx="8229600" cy="990600"/>
+          </a:xfrm>
+        </p:spPr>
+        <p:txBody>
+          <a:bodyPr>
+            <a:noAutofit/>
+          </a:bodyPr>
+          <a:lstStyle/>
+          <a:p>
+            <a:r>
+              <a:rPr lang="en-US" sz="4800" dirty="0"/>
+              <a:t>JSON </a:t>
+            </a:r>
+            <a:r>
+              <a:rPr lang="en-US" sz="4800" dirty="0" smtClean="0"/>
+              <a:t>Example Model</a:t>
+            </a:r>
+            <a:endParaRPr lang="en-US" sz="4800" dirty="0"/>
+          </a:p>
+        </p:txBody>
+      </p:sp>
+      <p:pic>
+        <p:nvPicPr>
+          <p:cNvPr id="1026" name="Picture 2"/>
+          <p:cNvPicPr>
+            <a:picLocks noChangeAspect="1" noChangeArrowheads="1"/>
+          </p:cNvPicPr>
+          <p:nvPr/>
+        </p:nvPicPr>
+        <p:blipFill>
+          <a:blip r:embed="rId3">
+            <a:extLst>
+              <a:ext uri="{28A0092B-C50C-407E-A947-70E740481C1C}">
+                <a14:useLocalDpi xmlns:a14="http://schemas.microsoft.com/office/drawing/2010/main" val="0"/>
+              </a:ext>
+            </a:extLst>
+          </a:blip>
+          <a:srcRect/>
+          <a:stretch>
+            <a:fillRect/>
+          </a:stretch>
+        </p:blipFill>
+        <p:spPr bwMode="auto">
+          <a:xfrm>
+            <a:off x="1904999" y="2286000"/>
+            <a:ext cx="5276795" cy="4343400"/>
+          </a:xfrm>
+          <a:prstGeom prst="rect">
+            <a:avLst/>
+          </a:prstGeom>
+          <a:noFill/>
+          <a:ln>
+            <a:noFill/>
+          </a:ln>
+          <a:extLst>
+            <a:ext uri="{909E8E84-426E-40DD-AFC4-6F175D3DCCD1}">
+              <a14:hiddenFill xmlns:a14="http://schemas.microsoft.com/office/drawing/2010/main">
+                <a:solidFill>
+                  <a:schemeClr val="accent1"/>
+                </a:solidFill>
+              </a14:hiddenFill>
+            </a:ext>
+            <a:ext uri="{91240B29-F687-4F45-9708-019B960494DF}">
+              <a14:hiddenLine xmlns:a14="http://schemas.microsoft.com/office/drawing/2010/main" w="9525">
+                <a:solidFill>
+                  <a:schemeClr val="tx1"/>
+                </a:solidFill>
+                <a:miter lim="800000"/>
+                <a:headEnd/>
+                <a:tailEnd/>
+              </a14:hiddenLine>
+            </a:ext>
+          </a:extLst>
+        </p:spPr>
+      </p:pic>
+      <p:sp>
+        <p:nvSpPr>
+          <p:cNvPr id="6" name="Content Placeholder 2"/>
+          <p:cNvSpPr>
+            <a:spLocks noGrp="1"/>
+          </p:cNvSpPr>
+          <p:nvPr>
+            <p:ph idx="1"/>
+          </p:nvPr>
+        </p:nvSpPr>
+        <p:spPr>
+          <a:xfrm>
+            <a:off x="457200" y="1524000"/>
+            <a:ext cx="8229600" cy="5105400"/>
+          </a:xfrm>
+        </p:spPr>
+        <p:txBody>
+          <a:bodyPr/>
+          <a:lstStyle/>
+          <a:p>
+            <a:r>
+              <a:rPr lang="en-US" dirty="0" smtClean="0"/>
+              <a:t>Patient Registration Example Fields:</a:t>
+            </a:r>
+            <a:endParaRPr lang="en-US" dirty="0" smtClean="0"/>
+          </a:p>
+        </p:txBody>
+      </p:sp>
+    </p:spTree>
+    <p:extLst>
+      <p:ext uri="{BB962C8B-B14F-4D97-AF65-F5344CB8AC3E}">
+        <p14:creationId xmlns:p14="http://schemas.microsoft.com/office/powerpoint/2010/main" val="2699097778"/>
+      </p:ext>
+    </p:extLst>
+  </p:cSld>
+  <p:clrMapOvr>
+    <a:masterClrMapping/>
+  </p:clrMapOvr>
+  <p:timing>
+    <p:tnLst>
+      <p:par>
+        <p:cTn id="1" dur="indefinite" restart="never" nodeType="tmRoot"/>
+      </p:par>
+    </p:tnLst>
+  </p:timing>
+</p:sld>
+</file>
+
+<file path=ppt/slides/slide39.xml><?xml version="1.0" encoding="utf-8"?>
+<p:sld xmlns:a="http://schemas.openxmlformats.org/drawingml/2006/main" xmlns:r="http://schemas.openxmlformats.org/officeDocument/2006/relationships" xmlns:p="http://schemas.openxmlformats.org/presentationml/2006/main">
+  <p:cSld>
+    <p:spTree>
+      <p:nvGrpSpPr>
+        <p:cNvPr id="1" name=""/>
+        <p:cNvGrpSpPr/>
+        <p:nvPr/>
+      </p:nvGrpSpPr>
+      <p:grpSpPr>
+        <a:xfrm>
+          <a:off x="0" y="0"/>
+          <a:ext cx="0" cy="0"/>
+          <a:chOff x="0" y="0"/>
+          <a:chExt cx="0" cy="0"/>
+        </a:xfrm>
+      </p:grpSpPr>
+      <p:sp>
+        <p:nvSpPr>
+          <p:cNvPr id="2" name="Title 1"/>
+          <p:cNvSpPr>
+            <a:spLocks noGrp="1"/>
+          </p:cNvSpPr>
+          <p:nvPr>
+            <p:ph type="title"/>
+          </p:nvPr>
+        </p:nvSpPr>
         <p:spPr/>
         <p:txBody>
           <a:bodyPr/>
@@ -16020,7 +16242,7 @@
         </p:spPr>
         <p:txBody>
           <a:bodyPr>
-            <a:normAutofit/>
+            <a:normAutofit fontScale="92500" lnSpcReduction="10000"/>
           </a:bodyPr>
           <a:lstStyle/>
           <a:p>
@@ -16056,6 +16278,17 @@
               <a:rPr lang="en-US" dirty="0" smtClean="0"/>
               <a:t>"</a:t>
             </a:r>
+          </a:p>
+          <a:p>
+            <a:r>
+              <a:rPr lang="en-US" dirty="0" smtClean="0"/>
+              <a:t>Create DB Username/Password of your choice </a:t>
+            </a:r>
+            <a:r>
+              <a:rPr lang="en-US" dirty="0" smtClean="0"/>
+              <a:t>under the "Users" Tab.</a:t>
+            </a:r>
+            <a:endParaRPr lang="en-US" dirty="0" smtClean="0"/>
           </a:p>
           <a:p>
             <a:r>
@@ -18567,12 +18800,13 @@
             <a:pPr lvl="2"/>
             <a:r>
               <a:rPr lang="en-US" dirty="0"/>
-              <a:t>a 3-byte counter, starting with a random value</a:t>
-            </a:r>
-            <a:r>
-              <a:rPr lang="en-US" dirty="0" smtClean="0"/>
-              <a:t>.</a:t>
-            </a:r>
+              <a:t>a 3-byte counter, starting with a random </a:t>
+            </a:r>
+            <a:r>
+              <a:rPr lang="en-US" dirty="0" smtClean="0"/>
+              <a:t>value</a:t>
+            </a:r>
+            <a:endParaRPr lang="en-US" dirty="0" smtClean="0"/>
           </a:p>
         </p:txBody>
       </p:sp>

</xml_diff>